<commit_message>
added charts for presentation Friday 2nd
</commit_message>
<xml_diff>
--- a/docs/charts.pptx
+++ b/docs/charts.pptx
@@ -6,6 +6,7 @@
   </p:sldMasterIdLst>
   <p:sldIdLst>
     <p:sldId id="256" r:id="rId2"/>
+    <p:sldId id="257" r:id="rId3"/>
   </p:sldIdLst>
   <p:sldSz cx="12192000" cy="6858000"/>
   <p:notesSz cx="6858000" cy="9144000"/>
@@ -104,13 +105,18 @@
       </a:defRPr>
     </a:lvl9pPr>
   </p:defaultTextStyle>
+  <p:extLst>
+    <p:ext uri="{EFAFB233-063F-42B5-8137-9DF3F51BA10A}">
+      <p15:sldGuideLst xmlns:p15="http://schemas.microsoft.com/office/powerpoint/2012/main"/>
+    </p:ext>
+  </p:extLst>
 </p:presentation>
 </file>
 
 <file path=ppt/revisionInfo.xml><?xml version="1.0" encoding="utf-8"?>
 <p1510:revInfo xmlns:a="http://schemas.openxmlformats.org/drawingml/2006/main" xmlns:r="http://schemas.openxmlformats.org/officeDocument/2006/relationships" xmlns:p1510="http://schemas.microsoft.com/office/powerpoint/2015/10/main">
   <p1510:revLst>
-    <p1510:client id="{A874BF5B-F729-471A-83B9-F8E79E947DA6}" v="323" dt="2024-07-28T21:37:22.993"/>
+    <p1510:client id="{A874BF5B-F729-471A-83B9-F8E79E947DA6}" v="333" dt="2024-08-01T20:43:18.257"/>
   </p1510:revLst>
 </p1510:revInfo>
 </file>
@@ -119,8 +125,8 @@
 <pc:chgInfo xmlns:a="http://schemas.openxmlformats.org/drawingml/2006/main" xmlns:r="http://schemas.openxmlformats.org/officeDocument/2006/relationships" xmlns:ac="http://schemas.microsoft.com/office/drawing/2013/main/command" xmlns:pc="http://schemas.microsoft.com/office/powerpoint/2013/main/command">
   <pc:docChgLst>
     <pc:chgData name="MARTINEZ SALCEDO, JOSEPH" userId="4d2c8988-b1c0-4e9d-83be-da9944182c7d" providerId="ADAL" clId="{A874BF5B-F729-471A-83B9-F8E79E947DA6}"/>
-    <pc:docChg chg="custSel addSld modSld">
-      <pc:chgData name="MARTINEZ SALCEDO, JOSEPH" userId="4d2c8988-b1c0-4e9d-83be-da9944182c7d" providerId="ADAL" clId="{A874BF5B-F729-471A-83B9-F8E79E947DA6}" dt="2024-07-28T21:37:22.993" v="365" actId="208"/>
+    <pc:docChg chg="undo custSel addSld modSld">
+      <pc:chgData name="MARTINEZ SALCEDO, JOSEPH" userId="4d2c8988-b1c0-4e9d-83be-da9944182c7d" providerId="ADAL" clId="{A874BF5B-F729-471A-83B9-F8E79E947DA6}" dt="2024-08-01T22:45:25.955" v="650" actId="20577"/>
       <pc:docMkLst>
         <pc:docMk/>
       </pc:docMkLst>
@@ -170,6 +176,261 @@
             <ac:graphicFrameMk id="4" creationId="{24E2E09E-6FA9-7587-4E41-A7C8B5AFD7A1}"/>
           </ac:graphicFrameMkLst>
         </pc:graphicFrameChg>
+      </pc:sldChg>
+      <pc:sldChg chg="addSp delSp modSp add mod">
+        <pc:chgData name="MARTINEZ SALCEDO, JOSEPH" userId="4d2c8988-b1c0-4e9d-83be-da9944182c7d" providerId="ADAL" clId="{A874BF5B-F729-471A-83B9-F8E79E947DA6}" dt="2024-08-01T22:45:25.955" v="650" actId="20577"/>
+        <pc:sldMkLst>
+          <pc:docMk/>
+          <pc:sldMk cId="2709825526" sldId="257"/>
+        </pc:sldMkLst>
+        <pc:spChg chg="add del">
+          <ac:chgData name="MARTINEZ SALCEDO, JOSEPH" userId="4d2c8988-b1c0-4e9d-83be-da9944182c7d" providerId="ADAL" clId="{A874BF5B-F729-471A-83B9-F8E79E947DA6}" dt="2024-08-01T20:32:59.549" v="369" actId="22"/>
+          <ac:spMkLst>
+            <pc:docMk/>
+            <pc:sldMk cId="2709825526" sldId="257"/>
+            <ac:spMk id="3" creationId="{C7E883D1-310D-52A0-7FEB-55BF9C533920}"/>
+          </ac:spMkLst>
+        </pc:spChg>
+        <pc:spChg chg="del">
+          <ac:chgData name="MARTINEZ SALCEDO, JOSEPH" userId="4d2c8988-b1c0-4e9d-83be-da9944182c7d" providerId="ADAL" clId="{A874BF5B-F729-471A-83B9-F8E79E947DA6}" dt="2024-08-01T20:40:34.475" v="491" actId="478"/>
+          <ac:spMkLst>
+            <pc:docMk/>
+            <pc:sldMk cId="2709825526" sldId="257"/>
+            <ac:spMk id="6" creationId="{8A3918BC-E1BB-9463-6154-D16596AE6C5F}"/>
+          </ac:spMkLst>
+        </pc:spChg>
+        <pc:spChg chg="add del">
+          <ac:chgData name="MARTINEZ SALCEDO, JOSEPH" userId="4d2c8988-b1c0-4e9d-83be-da9944182c7d" providerId="ADAL" clId="{A874BF5B-F729-471A-83B9-F8E79E947DA6}" dt="2024-08-01T20:33:03.524" v="371" actId="22"/>
+          <ac:spMkLst>
+            <pc:docMk/>
+            <pc:sldMk cId="2709825526" sldId="257"/>
+            <ac:spMk id="7" creationId="{43D00FA5-4A25-5018-DCB0-60FDB435AC9C}"/>
+          </ac:spMkLst>
+        </pc:spChg>
+        <pc:spChg chg="add del mod">
+          <ac:chgData name="MARTINEZ SALCEDO, JOSEPH" userId="4d2c8988-b1c0-4e9d-83be-da9944182c7d" providerId="ADAL" clId="{A874BF5B-F729-471A-83B9-F8E79E947DA6}" dt="2024-08-01T20:33:10.761" v="374" actId="478"/>
+          <ac:spMkLst>
+            <pc:docMk/>
+            <pc:sldMk cId="2709825526" sldId="257"/>
+            <ac:spMk id="9" creationId="{F460D8F8-198B-9F50-31DD-508D906BCE6F}"/>
+          </ac:spMkLst>
+        </pc:spChg>
+        <pc:spChg chg="add mod">
+          <ac:chgData name="MARTINEZ SALCEDO, JOSEPH" userId="4d2c8988-b1c0-4e9d-83be-da9944182c7d" providerId="ADAL" clId="{A874BF5B-F729-471A-83B9-F8E79E947DA6}" dt="2024-08-01T21:26:19.983" v="638" actId="2711"/>
+          <ac:spMkLst>
+            <pc:docMk/>
+            <pc:sldMk cId="2709825526" sldId="257"/>
+            <ac:spMk id="15" creationId="{3005288C-0185-5348-D2B1-A7F3225D62DE}"/>
+          </ac:spMkLst>
+        </pc:spChg>
+        <pc:spChg chg="add mod">
+          <ac:chgData name="MARTINEZ SALCEDO, JOSEPH" userId="4d2c8988-b1c0-4e9d-83be-da9944182c7d" providerId="ADAL" clId="{A874BF5B-F729-471A-83B9-F8E79E947DA6}" dt="2024-08-01T20:42:56.722" v="512" actId="1076"/>
+          <ac:spMkLst>
+            <pc:docMk/>
+            <pc:sldMk cId="2709825526" sldId="257"/>
+            <ac:spMk id="17" creationId="{E724CADB-5B01-BB84-3EEA-16EEECEDAEBD}"/>
+          </ac:spMkLst>
+        </pc:spChg>
+        <pc:spChg chg="add mod">
+          <ac:chgData name="MARTINEZ SALCEDO, JOSEPH" userId="4d2c8988-b1c0-4e9d-83be-da9944182c7d" providerId="ADAL" clId="{A874BF5B-F729-471A-83B9-F8E79E947DA6}" dt="2024-08-01T20:42:56.722" v="512" actId="1076"/>
+          <ac:spMkLst>
+            <pc:docMk/>
+            <pc:sldMk cId="2709825526" sldId="257"/>
+            <ac:spMk id="19" creationId="{7EC1BF4C-081B-20EE-CE2E-18C5FFF6D335}"/>
+          </ac:spMkLst>
+        </pc:spChg>
+        <pc:spChg chg="add mod">
+          <ac:chgData name="MARTINEZ SALCEDO, JOSEPH" userId="4d2c8988-b1c0-4e9d-83be-da9944182c7d" providerId="ADAL" clId="{A874BF5B-F729-471A-83B9-F8E79E947DA6}" dt="2024-08-01T20:42:56.722" v="512" actId="1076"/>
+          <ac:spMkLst>
+            <pc:docMk/>
+            <pc:sldMk cId="2709825526" sldId="257"/>
+            <ac:spMk id="20" creationId="{CDB81FAA-E00B-D117-B58C-B8434AA631CE}"/>
+          </ac:spMkLst>
+        </pc:spChg>
+        <pc:spChg chg="add mod">
+          <ac:chgData name="MARTINEZ SALCEDO, JOSEPH" userId="4d2c8988-b1c0-4e9d-83be-da9944182c7d" providerId="ADAL" clId="{A874BF5B-F729-471A-83B9-F8E79E947DA6}" dt="2024-08-01T20:42:56.722" v="512" actId="1076"/>
+          <ac:spMkLst>
+            <pc:docMk/>
+            <pc:sldMk cId="2709825526" sldId="257"/>
+            <ac:spMk id="21" creationId="{4AD45D7E-DBD4-95A1-DDD1-45E2A57DB8E6}"/>
+          </ac:spMkLst>
+        </pc:spChg>
+        <pc:spChg chg="add mod">
+          <ac:chgData name="MARTINEZ SALCEDO, JOSEPH" userId="4d2c8988-b1c0-4e9d-83be-da9944182c7d" providerId="ADAL" clId="{A874BF5B-F729-471A-83B9-F8E79E947DA6}" dt="2024-08-01T21:26:19.983" v="638" actId="2711"/>
+          <ac:spMkLst>
+            <pc:docMk/>
+            <pc:sldMk cId="2709825526" sldId="257"/>
+            <ac:spMk id="24" creationId="{5EA37D64-0AB4-7C94-F186-336593B3AE5B}"/>
+          </ac:spMkLst>
+        </pc:spChg>
+        <pc:spChg chg="add del mod">
+          <ac:chgData name="MARTINEZ SALCEDO, JOSEPH" userId="4d2c8988-b1c0-4e9d-83be-da9944182c7d" providerId="ADAL" clId="{A874BF5B-F729-471A-83B9-F8E79E947DA6}" dt="2024-08-01T21:09:12.777" v="636" actId="478"/>
+          <ac:spMkLst>
+            <pc:docMk/>
+            <pc:sldMk cId="2709825526" sldId="257"/>
+            <ac:spMk id="25" creationId="{7C2F6147-406E-703E-14AB-35E2F67C7E8C}"/>
+          </ac:spMkLst>
+        </pc:spChg>
+        <pc:spChg chg="add del mod">
+          <ac:chgData name="MARTINEZ SALCEDO, JOSEPH" userId="4d2c8988-b1c0-4e9d-83be-da9944182c7d" providerId="ADAL" clId="{A874BF5B-F729-471A-83B9-F8E79E947DA6}" dt="2024-08-01T20:40:24.175" v="488" actId="478"/>
+          <ac:spMkLst>
+            <pc:docMk/>
+            <pc:sldMk cId="2709825526" sldId="257"/>
+            <ac:spMk id="26" creationId="{AEDF8F88-71FF-0D00-9429-0841981E29D9}"/>
+          </ac:spMkLst>
+        </pc:spChg>
+        <pc:spChg chg="add del mod">
+          <ac:chgData name="MARTINEZ SALCEDO, JOSEPH" userId="4d2c8988-b1c0-4e9d-83be-da9944182c7d" providerId="ADAL" clId="{A874BF5B-F729-471A-83B9-F8E79E947DA6}" dt="2024-08-01T21:09:09.996" v="634" actId="478"/>
+          <ac:spMkLst>
+            <pc:docMk/>
+            <pc:sldMk cId="2709825526" sldId="257"/>
+            <ac:spMk id="27" creationId="{F3F172D5-D035-D151-7E1C-A6D1220B5F7D}"/>
+          </ac:spMkLst>
+        </pc:spChg>
+        <pc:spChg chg="add mod">
+          <ac:chgData name="MARTINEZ SALCEDO, JOSEPH" userId="4d2c8988-b1c0-4e9d-83be-da9944182c7d" providerId="ADAL" clId="{A874BF5B-F729-471A-83B9-F8E79E947DA6}" dt="2024-08-01T20:42:56.722" v="512" actId="1076"/>
+          <ac:spMkLst>
+            <pc:docMk/>
+            <pc:sldMk cId="2709825526" sldId="257"/>
+            <ac:spMk id="28" creationId="{477C8782-E285-35F6-1CB4-E9DF0AAA721C}"/>
+          </ac:spMkLst>
+        </pc:spChg>
+        <pc:spChg chg="add mod">
+          <ac:chgData name="MARTINEZ SALCEDO, JOSEPH" userId="4d2c8988-b1c0-4e9d-83be-da9944182c7d" providerId="ADAL" clId="{A874BF5B-F729-471A-83B9-F8E79E947DA6}" dt="2024-08-01T20:42:56.722" v="512" actId="1076"/>
+          <ac:spMkLst>
+            <pc:docMk/>
+            <pc:sldMk cId="2709825526" sldId="257"/>
+            <ac:spMk id="30" creationId="{4B3DB8F4-CB8D-87F4-3F88-2176BD1DBAA5}"/>
+          </ac:spMkLst>
+        </pc:spChg>
+        <pc:spChg chg="add mod">
+          <ac:chgData name="MARTINEZ SALCEDO, JOSEPH" userId="4d2c8988-b1c0-4e9d-83be-da9944182c7d" providerId="ADAL" clId="{A874BF5B-F729-471A-83B9-F8E79E947DA6}" dt="2024-08-01T21:26:19.983" v="638" actId="2711"/>
+          <ac:spMkLst>
+            <pc:docMk/>
+            <pc:sldMk cId="2709825526" sldId="257"/>
+            <ac:spMk id="31" creationId="{7A24AB4B-529E-A0C7-A063-DB226C845F1C}"/>
+          </ac:spMkLst>
+        </pc:spChg>
+        <pc:spChg chg="add del mod">
+          <ac:chgData name="MARTINEZ SALCEDO, JOSEPH" userId="4d2c8988-b1c0-4e9d-83be-da9944182c7d" providerId="ADAL" clId="{A874BF5B-F729-471A-83B9-F8E79E947DA6}" dt="2024-08-01T21:09:12.007" v="635" actId="478"/>
+          <ac:spMkLst>
+            <pc:docMk/>
+            <pc:sldMk cId="2709825526" sldId="257"/>
+            <ac:spMk id="32" creationId="{D467DACA-A586-C190-8F26-C0C0DE542C38}"/>
+          </ac:spMkLst>
+        </pc:spChg>
+        <pc:spChg chg="add del mod">
+          <ac:chgData name="MARTINEZ SALCEDO, JOSEPH" userId="4d2c8988-b1c0-4e9d-83be-da9944182c7d" providerId="ADAL" clId="{A874BF5B-F729-471A-83B9-F8E79E947DA6}" dt="2024-08-01T21:09:09.996" v="634" actId="478"/>
+          <ac:spMkLst>
+            <pc:docMk/>
+            <pc:sldMk cId="2709825526" sldId="257"/>
+            <ac:spMk id="33" creationId="{D22E4933-BF7C-ED7B-259E-8FE6C447A8AC}"/>
+          </ac:spMkLst>
+        </pc:spChg>
+        <pc:spChg chg="add mod">
+          <ac:chgData name="MARTINEZ SALCEDO, JOSEPH" userId="4d2c8988-b1c0-4e9d-83be-da9944182c7d" providerId="ADAL" clId="{A874BF5B-F729-471A-83B9-F8E79E947DA6}" dt="2024-08-01T20:42:56.722" v="512" actId="1076"/>
+          <ac:spMkLst>
+            <pc:docMk/>
+            <pc:sldMk cId="2709825526" sldId="257"/>
+            <ac:spMk id="34" creationId="{069355B0-4B04-892C-0E83-275081476096}"/>
+          </ac:spMkLst>
+        </pc:spChg>
+        <pc:spChg chg="add mod">
+          <ac:chgData name="MARTINEZ SALCEDO, JOSEPH" userId="4d2c8988-b1c0-4e9d-83be-da9944182c7d" providerId="ADAL" clId="{A874BF5B-F729-471A-83B9-F8E79E947DA6}" dt="2024-08-01T20:42:56.722" v="512" actId="1076"/>
+          <ac:spMkLst>
+            <pc:docMk/>
+            <pc:sldMk cId="2709825526" sldId="257"/>
+            <ac:spMk id="35" creationId="{E5492D53-4035-BB9D-9AC3-56DA2C9C5D8B}"/>
+          </ac:spMkLst>
+        </pc:spChg>
+        <pc:spChg chg="add mod">
+          <ac:chgData name="MARTINEZ SALCEDO, JOSEPH" userId="4d2c8988-b1c0-4e9d-83be-da9944182c7d" providerId="ADAL" clId="{A874BF5B-F729-471A-83B9-F8E79E947DA6}" dt="2024-08-01T22:45:25.955" v="650" actId="20577"/>
+          <ac:spMkLst>
+            <pc:docMk/>
+            <pc:sldMk cId="2709825526" sldId="257"/>
+            <ac:spMk id="36" creationId="{42240DA1-7D3D-7914-60B1-F6185689AFCB}"/>
+          </ac:spMkLst>
+        </pc:spChg>
+        <pc:spChg chg="add del mod">
+          <ac:chgData name="MARTINEZ SALCEDO, JOSEPH" userId="4d2c8988-b1c0-4e9d-83be-da9944182c7d" providerId="ADAL" clId="{A874BF5B-F729-471A-83B9-F8E79E947DA6}" dt="2024-08-01T20:43:55.726" v="547" actId="478"/>
+          <ac:spMkLst>
+            <pc:docMk/>
+            <pc:sldMk cId="2709825526" sldId="257"/>
+            <ac:spMk id="37" creationId="{BD3D9555-E216-8EDF-4413-ACC852E8F126}"/>
+          </ac:spMkLst>
+        </pc:spChg>
+        <pc:spChg chg="add del mod">
+          <ac:chgData name="MARTINEZ SALCEDO, JOSEPH" userId="4d2c8988-b1c0-4e9d-83be-da9944182c7d" providerId="ADAL" clId="{A874BF5B-F729-471A-83B9-F8E79E947DA6}" dt="2024-08-01T20:43:55.726" v="547" actId="478"/>
+          <ac:spMkLst>
+            <pc:docMk/>
+            <pc:sldMk cId="2709825526" sldId="257"/>
+            <ac:spMk id="38" creationId="{8DC9828E-7A93-4880-C6F3-64AC39482D94}"/>
+          </ac:spMkLst>
+        </pc:spChg>
+        <pc:spChg chg="add del mod">
+          <ac:chgData name="MARTINEZ SALCEDO, JOSEPH" userId="4d2c8988-b1c0-4e9d-83be-da9944182c7d" providerId="ADAL" clId="{A874BF5B-F729-471A-83B9-F8E79E947DA6}" dt="2024-08-01T20:43:57.650" v="548" actId="478"/>
+          <ac:spMkLst>
+            <pc:docMk/>
+            <pc:sldMk cId="2709825526" sldId="257"/>
+            <ac:spMk id="39" creationId="{8A1DB95D-B9BC-0EF0-4BC7-57A11DFFA91C}"/>
+          </ac:spMkLst>
+        </pc:spChg>
+        <pc:spChg chg="add mod">
+          <ac:chgData name="MARTINEZ SALCEDO, JOSEPH" userId="4d2c8988-b1c0-4e9d-83be-da9944182c7d" providerId="ADAL" clId="{A874BF5B-F729-471A-83B9-F8E79E947DA6}" dt="2024-08-01T21:08:45.487" v="633" actId="6549"/>
+          <ac:spMkLst>
+            <pc:docMk/>
+            <pc:sldMk cId="2709825526" sldId="257"/>
+            <ac:spMk id="40" creationId="{3CE5A3A2-382A-2F32-95B3-713C78EDBAB2}"/>
+          </ac:spMkLst>
+        </pc:spChg>
+        <pc:grpChg chg="add mod">
+          <ac:chgData name="MARTINEZ SALCEDO, JOSEPH" userId="4d2c8988-b1c0-4e9d-83be-da9944182c7d" providerId="ADAL" clId="{A874BF5B-F729-471A-83B9-F8E79E947DA6}" dt="2024-08-01T20:42:56.722" v="512" actId="1076"/>
+          <ac:grpSpMkLst>
+            <pc:docMk/>
+            <pc:sldMk cId="2709825526" sldId="257"/>
+            <ac:grpSpMk id="14" creationId="{699EDF74-4B53-1881-D41F-A1D983044518}"/>
+          </ac:grpSpMkLst>
+        </pc:grpChg>
+        <pc:graphicFrameChg chg="del">
+          <ac:chgData name="MARTINEZ SALCEDO, JOSEPH" userId="4d2c8988-b1c0-4e9d-83be-da9944182c7d" providerId="ADAL" clId="{A874BF5B-F729-471A-83B9-F8E79E947DA6}" dt="2024-08-01T20:32:57.502" v="367" actId="478"/>
+          <ac:graphicFrameMkLst>
+            <pc:docMk/>
+            <pc:sldMk cId="2709825526" sldId="257"/>
+            <ac:graphicFrameMk id="4" creationId="{24E2E09E-6FA9-7587-4E41-A7C8B5AFD7A1}"/>
+          </ac:graphicFrameMkLst>
+        </pc:graphicFrameChg>
+        <pc:picChg chg="add mod ord modCrop">
+          <ac:chgData name="MARTINEZ SALCEDO, JOSEPH" userId="4d2c8988-b1c0-4e9d-83be-da9944182c7d" providerId="ADAL" clId="{A874BF5B-F729-471A-83B9-F8E79E947DA6}" dt="2024-08-01T20:34:51.705" v="388" actId="164"/>
+          <ac:picMkLst>
+            <pc:docMk/>
+            <pc:sldMk cId="2709825526" sldId="257"/>
+            <ac:picMk id="11" creationId="{9CBDEC0F-7874-48F9-56B9-C426C87DE223}"/>
+          </ac:picMkLst>
+        </pc:picChg>
+        <pc:picChg chg="add mod ord modCrop">
+          <ac:chgData name="MARTINEZ SALCEDO, JOSEPH" userId="4d2c8988-b1c0-4e9d-83be-da9944182c7d" providerId="ADAL" clId="{A874BF5B-F729-471A-83B9-F8E79E947DA6}" dt="2024-08-01T20:34:51.705" v="388" actId="164"/>
+          <ac:picMkLst>
+            <pc:docMk/>
+            <pc:sldMk cId="2709825526" sldId="257"/>
+            <ac:picMk id="13" creationId="{FAF2334C-8BB0-0600-7995-9999A566E2FF}"/>
+          </ac:picMkLst>
+        </pc:picChg>
+        <pc:picChg chg="add mod">
+          <ac:chgData name="MARTINEZ SALCEDO, JOSEPH" userId="4d2c8988-b1c0-4e9d-83be-da9944182c7d" providerId="ADAL" clId="{A874BF5B-F729-471A-83B9-F8E79E947DA6}" dt="2024-08-01T20:42:56.722" v="512" actId="1076"/>
+          <ac:picMkLst>
+            <pc:docMk/>
+            <pc:sldMk cId="2709825526" sldId="257"/>
+            <ac:picMk id="23" creationId="{A6399A2A-D518-6381-EF94-DEED132F1216}"/>
+          </ac:picMkLst>
+        </pc:picChg>
+        <pc:picChg chg="add del mod">
+          <ac:chgData name="MARTINEZ SALCEDO, JOSEPH" userId="4d2c8988-b1c0-4e9d-83be-da9944182c7d" providerId="ADAL" clId="{A874BF5B-F729-471A-83B9-F8E79E947DA6}" dt="2024-08-01T20:40:01.160" v="465" actId="478"/>
+          <ac:picMkLst>
+            <pc:docMk/>
+            <pc:sldMk cId="2709825526" sldId="257"/>
+            <ac:picMk id="29" creationId="{D6506923-2829-EA48-58CD-DA8EAF5CBEDB}"/>
+          </ac:picMkLst>
+        </pc:picChg>
       </pc:sldChg>
     </pc:docChg>
   </pc:docChgLst>
@@ -3657,7 +3918,7 @@
           <a:p>
             <a:fld id="{9984A58C-2BFC-4913-990E-B9A6D8E37F76}" type="datetimeFigureOut">
               <a:rPr lang="en-US" smtClean="0"/>
-              <a:t>7/28/2024</a:t>
+              <a:t>8/1/2024</a:t>
             </a:fld>
             <a:endParaRPr lang="en-US"/>
           </a:p>
@@ -3855,7 +4116,7 @@
           <a:p>
             <a:fld id="{9984A58C-2BFC-4913-990E-B9A6D8E37F76}" type="datetimeFigureOut">
               <a:rPr lang="en-US" smtClean="0"/>
-              <a:t>7/28/2024</a:t>
+              <a:t>8/1/2024</a:t>
             </a:fld>
             <a:endParaRPr lang="en-US"/>
           </a:p>
@@ -4063,7 +4324,7 @@
           <a:p>
             <a:fld id="{9984A58C-2BFC-4913-990E-B9A6D8E37F76}" type="datetimeFigureOut">
               <a:rPr lang="en-US" smtClean="0"/>
-              <a:t>7/28/2024</a:t>
+              <a:t>8/1/2024</a:t>
             </a:fld>
             <a:endParaRPr lang="en-US"/>
           </a:p>
@@ -4261,7 +4522,7 @@
           <a:p>
             <a:fld id="{9984A58C-2BFC-4913-990E-B9A6D8E37F76}" type="datetimeFigureOut">
               <a:rPr lang="en-US" smtClean="0"/>
-              <a:t>7/28/2024</a:t>
+              <a:t>8/1/2024</a:t>
             </a:fld>
             <a:endParaRPr lang="en-US"/>
           </a:p>
@@ -4536,7 +4797,7 @@
           <a:p>
             <a:fld id="{9984A58C-2BFC-4913-990E-B9A6D8E37F76}" type="datetimeFigureOut">
               <a:rPr lang="en-US" smtClean="0"/>
-              <a:t>7/28/2024</a:t>
+              <a:t>8/1/2024</a:t>
             </a:fld>
             <a:endParaRPr lang="en-US"/>
           </a:p>
@@ -4801,7 +5062,7 @@
           <a:p>
             <a:fld id="{9984A58C-2BFC-4913-990E-B9A6D8E37F76}" type="datetimeFigureOut">
               <a:rPr lang="en-US" smtClean="0"/>
-              <a:t>7/28/2024</a:t>
+              <a:t>8/1/2024</a:t>
             </a:fld>
             <a:endParaRPr lang="en-US"/>
           </a:p>
@@ -5213,7 +5474,7 @@
           <a:p>
             <a:fld id="{9984A58C-2BFC-4913-990E-B9A6D8E37F76}" type="datetimeFigureOut">
               <a:rPr lang="en-US" smtClean="0"/>
-              <a:t>7/28/2024</a:t>
+              <a:t>8/1/2024</a:t>
             </a:fld>
             <a:endParaRPr lang="en-US"/>
           </a:p>
@@ -5354,7 +5615,7 @@
           <a:p>
             <a:fld id="{9984A58C-2BFC-4913-990E-B9A6D8E37F76}" type="datetimeFigureOut">
               <a:rPr lang="en-US" smtClean="0"/>
-              <a:t>7/28/2024</a:t>
+              <a:t>8/1/2024</a:t>
             </a:fld>
             <a:endParaRPr lang="en-US"/>
           </a:p>
@@ -5467,7 +5728,7 @@
           <a:p>
             <a:fld id="{9984A58C-2BFC-4913-990E-B9A6D8E37F76}" type="datetimeFigureOut">
               <a:rPr lang="en-US" smtClean="0"/>
-              <a:t>7/28/2024</a:t>
+              <a:t>8/1/2024</a:t>
             </a:fld>
             <a:endParaRPr lang="en-US"/>
           </a:p>
@@ -5778,7 +6039,7 @@
           <a:p>
             <a:fld id="{9984A58C-2BFC-4913-990E-B9A6D8E37F76}" type="datetimeFigureOut">
               <a:rPr lang="en-US" smtClean="0"/>
-              <a:t>7/28/2024</a:t>
+              <a:t>8/1/2024</a:t>
             </a:fld>
             <a:endParaRPr lang="en-US"/>
           </a:p>
@@ -6066,7 +6327,7 @@
           <a:p>
             <a:fld id="{9984A58C-2BFC-4913-990E-B9A6D8E37F76}" type="datetimeFigureOut">
               <a:rPr lang="en-US" smtClean="0"/>
-              <a:t>7/28/2024</a:t>
+              <a:t>8/1/2024</a:t>
             </a:fld>
             <a:endParaRPr lang="en-US"/>
           </a:p>
@@ -6307,7 +6568,7 @@
           <a:p>
             <a:fld id="{9984A58C-2BFC-4913-990E-B9A6D8E37F76}" type="datetimeFigureOut">
               <a:rPr lang="en-US" smtClean="0"/>
-              <a:t>7/28/2024</a:t>
+              <a:t>8/1/2024</a:t>
             </a:fld>
             <a:endParaRPr lang="en-US"/>
           </a:p>
@@ -6858,6 +7119,705 @@
 </p:sld>
 </file>
 
+<file path=ppt/slides/slide2.xml><?xml version="1.0" encoding="utf-8"?>
+<p:sld xmlns:a="http://schemas.openxmlformats.org/drawingml/2006/main" xmlns:r="http://schemas.openxmlformats.org/officeDocument/2006/relationships" xmlns:p="http://schemas.openxmlformats.org/presentationml/2006/main">
+  <p:cSld>
+    <p:spTree>
+      <p:nvGrpSpPr>
+        <p:cNvPr id="1" name=""/>
+        <p:cNvGrpSpPr/>
+        <p:nvPr/>
+      </p:nvGrpSpPr>
+      <p:grpSpPr>
+        <a:xfrm>
+          <a:off x="0" y="0"/>
+          <a:ext cx="0" cy="0"/>
+          <a:chOff x="0" y="0"/>
+          <a:chExt cx="0" cy="0"/>
+        </a:xfrm>
+      </p:grpSpPr>
+      <p:grpSp>
+        <p:nvGrpSpPr>
+          <p:cNvPr id="14" name="Group 13">
+            <a:extLst>
+              <a:ext uri="{FF2B5EF4-FFF2-40B4-BE49-F238E27FC236}">
+                <a16:creationId xmlns:a16="http://schemas.microsoft.com/office/drawing/2014/main" id="{699EDF74-4B53-1881-D41F-A1D983044518}"/>
+              </a:ext>
+            </a:extLst>
+          </p:cNvPr>
+          <p:cNvGrpSpPr/>
+          <p:nvPr/>
+        </p:nvGrpSpPr>
+        <p:grpSpPr>
+          <a:xfrm>
+            <a:off x="-4355012" y="1876011"/>
+            <a:ext cx="5563839" cy="5200107"/>
+            <a:chOff x="532161" y="418373"/>
+            <a:chExt cx="4690080" cy="4202984"/>
+          </a:xfrm>
+        </p:grpSpPr>
+        <p:pic>
+          <p:nvPicPr>
+            <p:cNvPr id="11" name="Picture 10">
+              <a:extLst>
+                <a:ext uri="{FF2B5EF4-FFF2-40B4-BE49-F238E27FC236}">
+                  <a16:creationId xmlns:a16="http://schemas.microsoft.com/office/drawing/2014/main" id="{9CBDEC0F-7874-48F9-56B9-C426C87DE223}"/>
+                </a:ext>
+              </a:extLst>
+            </p:cNvPr>
+            <p:cNvPicPr>
+              <a:picLocks noChangeAspect="1"/>
+            </p:cNvPicPr>
+            <p:nvPr/>
+          </p:nvPicPr>
+          <p:blipFill rotWithShape="1">
+            <a:blip r:embed="rId2"/>
+            <a:srcRect r="24611" b="54855"/>
+            <a:stretch/>
+          </p:blipFill>
+          <p:spPr>
+            <a:xfrm>
+              <a:off x="532161" y="418373"/>
+              <a:ext cx="4690080" cy="1898107"/>
+            </a:xfrm>
+            <a:prstGeom prst="rect">
+              <a:avLst/>
+            </a:prstGeom>
+          </p:spPr>
+        </p:pic>
+        <p:pic>
+          <p:nvPicPr>
+            <p:cNvPr id="13" name="Picture 12">
+              <a:extLst>
+                <a:ext uri="{FF2B5EF4-FFF2-40B4-BE49-F238E27FC236}">
+                  <a16:creationId xmlns:a16="http://schemas.microsoft.com/office/drawing/2014/main" id="{FAF2334C-8BB0-0600-7995-9999A566E2FF}"/>
+                </a:ext>
+              </a:extLst>
+            </p:cNvPr>
+            <p:cNvPicPr>
+              <a:picLocks noChangeAspect="1"/>
+            </p:cNvPicPr>
+            <p:nvPr/>
+          </p:nvPicPr>
+          <p:blipFill rotWithShape="1">
+            <a:blip r:embed="rId3"/>
+            <a:srcRect r="24611"/>
+            <a:stretch/>
+          </p:blipFill>
+          <p:spPr>
+            <a:xfrm>
+              <a:off x="532161" y="2316481"/>
+              <a:ext cx="4690080" cy="2304876"/>
+            </a:xfrm>
+            <a:prstGeom prst="rect">
+              <a:avLst/>
+            </a:prstGeom>
+          </p:spPr>
+        </p:pic>
+      </p:grpSp>
+      <p:sp>
+        <p:nvSpPr>
+          <p:cNvPr id="15" name="TextBox 14">
+            <a:extLst>
+              <a:ext uri="{FF2B5EF4-FFF2-40B4-BE49-F238E27FC236}">
+                <a16:creationId xmlns:a16="http://schemas.microsoft.com/office/drawing/2014/main" id="{3005288C-0185-5348-D2B1-A7F3225D62DE}"/>
+              </a:ext>
+            </a:extLst>
+          </p:cNvPr>
+          <p:cNvSpPr txBox="1"/>
+          <p:nvPr/>
+        </p:nvSpPr>
+        <p:spPr>
+          <a:xfrm>
+            <a:off x="1018014" y="1290785"/>
+            <a:ext cx="3024154" cy="585225"/>
+          </a:xfrm>
+          <a:prstGeom prst="rect">
+            <a:avLst/>
+          </a:prstGeom>
+          <a:noFill/>
+        </p:spPr>
+        <p:txBody>
+          <a:bodyPr wrap="square" rtlCol="0">
+            <a:spAutoFit/>
+          </a:bodyPr>
+          <a:lstStyle/>
+          <a:p>
+            <a:pPr algn="ctr">
+              <a:lnSpc>
+                <a:spcPts val="3500"/>
+              </a:lnSpc>
+            </a:pPr>
+            <a:r>
+              <a:rPr lang="en-US" sz="4400" dirty="0">
+                <a:latin typeface="Aptos SemiBold" panose="020B0004020202020204" pitchFamily="34" charset="0"/>
+              </a:rPr>
+              <a:t>Relevance</a:t>
+            </a:r>
+          </a:p>
+        </p:txBody>
+      </p:sp>
+      <p:sp>
+        <p:nvSpPr>
+          <p:cNvPr id="17" name="TextBox 16">
+            <a:extLst>
+              <a:ext uri="{FF2B5EF4-FFF2-40B4-BE49-F238E27FC236}">
+                <a16:creationId xmlns:a16="http://schemas.microsoft.com/office/drawing/2014/main" id="{E724CADB-5B01-BB84-3EEA-16EEECEDAEBD}"/>
+              </a:ext>
+            </a:extLst>
+          </p:cNvPr>
+          <p:cNvSpPr txBox="1"/>
+          <p:nvPr/>
+        </p:nvSpPr>
+        <p:spPr>
+          <a:xfrm>
+            <a:off x="1724446" y="4430100"/>
+            <a:ext cx="1356360" cy="1477328"/>
+          </a:xfrm>
+          <a:prstGeom prst="rect">
+            <a:avLst/>
+          </a:prstGeom>
+          <a:noFill/>
+        </p:spPr>
+        <p:txBody>
+          <a:bodyPr wrap="square" lIns="0" tIns="0" rIns="0" bIns="0">
+            <a:spAutoFit/>
+          </a:bodyPr>
+          <a:lstStyle/>
+          <a:p>
+            <a:pPr algn="ctr"/>
+            <a:r>
+              <a:rPr lang="en-US" sz="9600" b="1" dirty="0">
+                <a:solidFill>
+                  <a:srgbClr val="C00000"/>
+                </a:solidFill>
+              </a:rPr>
+              <a:t>X</a:t>
+            </a:r>
+          </a:p>
+        </p:txBody>
+      </p:sp>
+      <p:sp>
+        <p:nvSpPr>
+          <p:cNvPr id="19" name="TextBox 18">
+            <a:extLst>
+              <a:ext uri="{FF2B5EF4-FFF2-40B4-BE49-F238E27FC236}">
+                <a16:creationId xmlns:a16="http://schemas.microsoft.com/office/drawing/2014/main" id="{7EC1BF4C-081B-20EE-CE2E-18C5FFF6D335}"/>
+              </a:ext>
+            </a:extLst>
+          </p:cNvPr>
+          <p:cNvSpPr txBox="1"/>
+          <p:nvPr/>
+        </p:nvSpPr>
+        <p:spPr>
+          <a:xfrm>
+            <a:off x="1721906" y="3233676"/>
+            <a:ext cx="1440182" cy="1477328"/>
+          </a:xfrm>
+          <a:prstGeom prst="rect">
+            <a:avLst/>
+          </a:prstGeom>
+          <a:noFill/>
+        </p:spPr>
+        <p:txBody>
+          <a:bodyPr wrap="square" lIns="0" tIns="0" rIns="0" bIns="0">
+            <a:spAutoFit/>
+          </a:bodyPr>
+          <a:lstStyle/>
+          <a:p>
+            <a:pPr algn="ctr"/>
+            <a:r>
+              <a:rPr lang="en-US" sz="9600" b="1" dirty="0">
+                <a:solidFill>
+                  <a:srgbClr val="00B050"/>
+                </a:solidFill>
+              </a:rPr>
+              <a:t>✓</a:t>
+            </a:r>
+          </a:p>
+        </p:txBody>
+      </p:sp>
+      <p:sp>
+        <p:nvSpPr>
+          <p:cNvPr id="20" name="TextBox 19">
+            <a:extLst>
+              <a:ext uri="{FF2B5EF4-FFF2-40B4-BE49-F238E27FC236}">
+                <a16:creationId xmlns:a16="http://schemas.microsoft.com/office/drawing/2014/main" id="{CDB81FAA-E00B-D117-B58C-B8434AA631CE}"/>
+              </a:ext>
+            </a:extLst>
+          </p:cNvPr>
+          <p:cNvSpPr txBox="1"/>
+          <p:nvPr/>
+        </p:nvSpPr>
+        <p:spPr>
+          <a:xfrm>
+            <a:off x="1724446" y="5598790"/>
+            <a:ext cx="1356360" cy="1477328"/>
+          </a:xfrm>
+          <a:prstGeom prst="rect">
+            <a:avLst/>
+          </a:prstGeom>
+          <a:noFill/>
+        </p:spPr>
+        <p:txBody>
+          <a:bodyPr wrap="square" lIns="0" tIns="0" rIns="0" bIns="0">
+            <a:spAutoFit/>
+          </a:bodyPr>
+          <a:lstStyle/>
+          <a:p>
+            <a:pPr algn="ctr"/>
+            <a:r>
+              <a:rPr lang="en-US" sz="9600" b="1" dirty="0">
+                <a:solidFill>
+                  <a:srgbClr val="C00000"/>
+                </a:solidFill>
+              </a:rPr>
+              <a:t>X</a:t>
+            </a:r>
+          </a:p>
+        </p:txBody>
+      </p:sp>
+      <p:sp>
+        <p:nvSpPr>
+          <p:cNvPr id="21" name="TextBox 20">
+            <a:extLst>
+              <a:ext uri="{FF2B5EF4-FFF2-40B4-BE49-F238E27FC236}">
+                <a16:creationId xmlns:a16="http://schemas.microsoft.com/office/drawing/2014/main" id="{4AD45D7E-DBD4-95A1-DDD1-45E2A57DB8E6}"/>
+              </a:ext>
+            </a:extLst>
+          </p:cNvPr>
+          <p:cNvSpPr txBox="1"/>
+          <p:nvPr/>
+        </p:nvSpPr>
+        <p:spPr>
+          <a:xfrm>
+            <a:off x="1721906" y="1802439"/>
+            <a:ext cx="1440182" cy="1477328"/>
+          </a:xfrm>
+          <a:prstGeom prst="rect">
+            <a:avLst/>
+          </a:prstGeom>
+          <a:noFill/>
+        </p:spPr>
+        <p:txBody>
+          <a:bodyPr wrap="square" lIns="0" tIns="0" rIns="0" bIns="0">
+            <a:spAutoFit/>
+          </a:bodyPr>
+          <a:lstStyle/>
+          <a:p>
+            <a:pPr algn="ctr"/>
+            <a:r>
+              <a:rPr lang="en-US" sz="9600" b="1" dirty="0">
+                <a:solidFill>
+                  <a:srgbClr val="00B050"/>
+                </a:solidFill>
+              </a:rPr>
+              <a:t>✓</a:t>
+            </a:r>
+          </a:p>
+        </p:txBody>
+      </p:sp>
+      <p:pic>
+        <p:nvPicPr>
+          <p:cNvPr id="23" name="Graphic 22" descr="Filter with solid fill">
+            <a:extLst>
+              <a:ext uri="{FF2B5EF4-FFF2-40B4-BE49-F238E27FC236}">
+                <a16:creationId xmlns:a16="http://schemas.microsoft.com/office/drawing/2014/main" id="{A6399A2A-D518-6381-EF94-DEED132F1216}"/>
+              </a:ext>
+            </a:extLst>
+          </p:cNvPr>
+          <p:cNvPicPr>
+            <a:picLocks noChangeAspect="1"/>
+          </p:cNvPicPr>
+          <p:nvPr/>
+        </p:nvPicPr>
+        <p:blipFill>
+          <a:blip r:embed="rId4">
+            <a:extLst>
+              <a:ext uri="{28A0092B-C50C-407E-A947-70E740481C1C}">
+                <a14:useLocalDpi xmlns:a14="http://schemas.microsoft.com/office/drawing/2010/main" val="0"/>
+              </a:ext>
+              <a:ext uri="{96DAC541-7B7A-43D3-8B79-37D633B846F1}">
+                <asvg:svgBlip xmlns:asvg="http://schemas.microsoft.com/office/drawing/2016/SVG/main" r:embed="rId5"/>
+              </a:ext>
+            </a:extLst>
+          </a:blip>
+          <a:stretch>
+            <a:fillRect/>
+          </a:stretch>
+        </p:blipFill>
+        <p:spPr>
+          <a:xfrm>
+            <a:off x="441750" y="961611"/>
+            <a:ext cx="914400" cy="914400"/>
+          </a:xfrm>
+          <a:prstGeom prst="rect">
+            <a:avLst/>
+          </a:prstGeom>
+        </p:spPr>
+      </p:pic>
+      <p:sp>
+        <p:nvSpPr>
+          <p:cNvPr id="24" name="TextBox 23">
+            <a:extLst>
+              <a:ext uri="{FF2B5EF4-FFF2-40B4-BE49-F238E27FC236}">
+                <a16:creationId xmlns:a16="http://schemas.microsoft.com/office/drawing/2014/main" id="{5EA37D64-0AB4-7C94-F186-336593B3AE5B}"/>
+              </a:ext>
+            </a:extLst>
+          </p:cNvPr>
+          <p:cNvSpPr txBox="1"/>
+          <p:nvPr/>
+        </p:nvSpPr>
+        <p:spPr>
+          <a:xfrm>
+            <a:off x="3943108" y="1290785"/>
+            <a:ext cx="2763521" cy="585225"/>
+          </a:xfrm>
+          <a:prstGeom prst="rect">
+            <a:avLst/>
+          </a:prstGeom>
+          <a:noFill/>
+        </p:spPr>
+        <p:txBody>
+          <a:bodyPr wrap="square" rtlCol="0">
+            <a:spAutoFit/>
+          </a:bodyPr>
+          <a:lstStyle/>
+          <a:p>
+            <a:pPr algn="ctr">
+              <a:lnSpc>
+                <a:spcPts val="3500"/>
+              </a:lnSpc>
+            </a:pPr>
+            <a:r>
+              <a:rPr lang="en-US" sz="4400" dirty="0">
+                <a:latin typeface="Aptos SemiBold" panose="020B0004020202020204" pitchFamily="34" charset="0"/>
+              </a:rPr>
+              <a:t>Concern</a:t>
+            </a:r>
+          </a:p>
+        </p:txBody>
+      </p:sp>
+      <p:sp>
+        <p:nvSpPr>
+          <p:cNvPr id="28" name="TextBox 27">
+            <a:extLst>
+              <a:ext uri="{FF2B5EF4-FFF2-40B4-BE49-F238E27FC236}">
+                <a16:creationId xmlns:a16="http://schemas.microsoft.com/office/drawing/2014/main" id="{477C8782-E285-35F6-1CB4-E9DF0AAA721C}"/>
+              </a:ext>
+            </a:extLst>
+          </p:cNvPr>
+          <p:cNvSpPr txBox="1"/>
+          <p:nvPr/>
+        </p:nvSpPr>
+        <p:spPr>
+          <a:xfrm>
+            <a:off x="4669547" y="1820949"/>
+            <a:ext cx="1440182" cy="1477328"/>
+          </a:xfrm>
+          <a:prstGeom prst="rect">
+            <a:avLst/>
+          </a:prstGeom>
+          <a:noFill/>
+        </p:spPr>
+        <p:txBody>
+          <a:bodyPr wrap="square" lIns="0" tIns="0" rIns="0" bIns="0">
+            <a:spAutoFit/>
+          </a:bodyPr>
+          <a:lstStyle/>
+          <a:p>
+            <a:pPr algn="ctr"/>
+            <a:r>
+              <a:rPr lang="en-US" sz="9600" b="1" dirty="0">
+                <a:solidFill>
+                  <a:srgbClr val="00B050"/>
+                </a:solidFill>
+              </a:rPr>
+              <a:t>✓</a:t>
+            </a:r>
+          </a:p>
+        </p:txBody>
+      </p:sp>
+      <p:sp>
+        <p:nvSpPr>
+          <p:cNvPr id="30" name="TextBox 29">
+            <a:extLst>
+              <a:ext uri="{FF2B5EF4-FFF2-40B4-BE49-F238E27FC236}">
+                <a16:creationId xmlns:a16="http://schemas.microsoft.com/office/drawing/2014/main" id="{4B3DB8F4-CB8D-87F4-3F88-2176BD1DBAA5}"/>
+              </a:ext>
+            </a:extLst>
+          </p:cNvPr>
+          <p:cNvSpPr txBox="1"/>
+          <p:nvPr/>
+        </p:nvSpPr>
+        <p:spPr>
+          <a:xfrm>
+            <a:off x="4646689" y="3298277"/>
+            <a:ext cx="1356360" cy="1477328"/>
+          </a:xfrm>
+          <a:prstGeom prst="rect">
+            <a:avLst/>
+          </a:prstGeom>
+          <a:noFill/>
+        </p:spPr>
+        <p:txBody>
+          <a:bodyPr wrap="square" lIns="0" tIns="0" rIns="0" bIns="0">
+            <a:spAutoFit/>
+          </a:bodyPr>
+          <a:lstStyle/>
+          <a:p>
+            <a:pPr algn="ctr"/>
+            <a:r>
+              <a:rPr lang="en-US" sz="9600" b="1" dirty="0">
+                <a:solidFill>
+                  <a:srgbClr val="C00000"/>
+                </a:solidFill>
+              </a:rPr>
+              <a:t>X</a:t>
+            </a:r>
+          </a:p>
+        </p:txBody>
+      </p:sp>
+      <p:sp>
+        <p:nvSpPr>
+          <p:cNvPr id="31" name="TextBox 30">
+            <a:extLst>
+              <a:ext uri="{FF2B5EF4-FFF2-40B4-BE49-F238E27FC236}">
+                <a16:creationId xmlns:a16="http://schemas.microsoft.com/office/drawing/2014/main" id="{7A24AB4B-529E-A0C7-A063-DB226C845F1C}"/>
+              </a:ext>
+            </a:extLst>
+          </p:cNvPr>
+          <p:cNvSpPr txBox="1"/>
+          <p:nvPr/>
+        </p:nvSpPr>
+        <p:spPr>
+          <a:xfrm>
+            <a:off x="6728185" y="1273850"/>
+            <a:ext cx="2763521" cy="585225"/>
+          </a:xfrm>
+          <a:prstGeom prst="rect">
+            <a:avLst/>
+          </a:prstGeom>
+          <a:noFill/>
+        </p:spPr>
+        <p:txBody>
+          <a:bodyPr wrap="square" rtlCol="0">
+            <a:spAutoFit/>
+          </a:bodyPr>
+          <a:lstStyle/>
+          <a:p>
+            <a:pPr algn="ctr">
+              <a:lnSpc>
+                <a:spcPts val="3500"/>
+              </a:lnSpc>
+            </a:pPr>
+            <a:r>
+              <a:rPr lang="en-US" sz="4400" dirty="0">
+                <a:latin typeface="Aptos SemiBold" panose="020B0004020202020204" pitchFamily="34" charset="0"/>
+              </a:rPr>
+              <a:t>Usage</a:t>
+            </a:r>
+          </a:p>
+        </p:txBody>
+      </p:sp>
+      <p:sp>
+        <p:nvSpPr>
+          <p:cNvPr id="34" name="TextBox 33">
+            <a:extLst>
+              <a:ext uri="{FF2B5EF4-FFF2-40B4-BE49-F238E27FC236}">
+                <a16:creationId xmlns:a16="http://schemas.microsoft.com/office/drawing/2014/main" id="{069355B0-4B04-892C-0E83-275081476096}"/>
+              </a:ext>
+            </a:extLst>
+          </p:cNvPr>
+          <p:cNvSpPr txBox="1"/>
+          <p:nvPr/>
+        </p:nvSpPr>
+        <p:spPr>
+          <a:xfrm>
+            <a:off x="7454624" y="3252186"/>
+            <a:ext cx="1440182" cy="1477328"/>
+          </a:xfrm>
+          <a:prstGeom prst="rect">
+            <a:avLst/>
+          </a:prstGeom>
+          <a:noFill/>
+        </p:spPr>
+        <p:txBody>
+          <a:bodyPr wrap="square" lIns="0" tIns="0" rIns="0" bIns="0">
+            <a:spAutoFit/>
+          </a:bodyPr>
+          <a:lstStyle/>
+          <a:p>
+            <a:pPr algn="ctr"/>
+            <a:r>
+              <a:rPr lang="en-US" sz="9600" b="1" dirty="0">
+                <a:solidFill>
+                  <a:srgbClr val="00B050"/>
+                </a:solidFill>
+              </a:rPr>
+              <a:t>✓</a:t>
+            </a:r>
+          </a:p>
+        </p:txBody>
+      </p:sp>
+      <p:sp>
+        <p:nvSpPr>
+          <p:cNvPr id="35" name="TextBox 34">
+            <a:extLst>
+              <a:ext uri="{FF2B5EF4-FFF2-40B4-BE49-F238E27FC236}">
+                <a16:creationId xmlns:a16="http://schemas.microsoft.com/office/drawing/2014/main" id="{E5492D53-4035-BB9D-9AC3-56DA2C9C5D8B}"/>
+              </a:ext>
+            </a:extLst>
+          </p:cNvPr>
+          <p:cNvSpPr txBox="1"/>
+          <p:nvPr/>
+        </p:nvSpPr>
+        <p:spPr>
+          <a:xfrm>
+            <a:off x="7431766" y="1829204"/>
+            <a:ext cx="1356360" cy="1477328"/>
+          </a:xfrm>
+          <a:prstGeom prst="rect">
+            <a:avLst/>
+          </a:prstGeom>
+          <a:noFill/>
+        </p:spPr>
+        <p:txBody>
+          <a:bodyPr wrap="square" lIns="0" tIns="0" rIns="0" bIns="0">
+            <a:spAutoFit/>
+          </a:bodyPr>
+          <a:lstStyle/>
+          <a:p>
+            <a:pPr algn="ctr"/>
+            <a:r>
+              <a:rPr lang="en-US" sz="9600" b="1" dirty="0">
+                <a:solidFill>
+                  <a:srgbClr val="C00000"/>
+                </a:solidFill>
+              </a:rPr>
+              <a:t>X</a:t>
+            </a:r>
+          </a:p>
+        </p:txBody>
+      </p:sp>
+      <p:sp>
+        <p:nvSpPr>
+          <p:cNvPr id="36" name="TextBox 35">
+            <a:extLst>
+              <a:ext uri="{FF2B5EF4-FFF2-40B4-BE49-F238E27FC236}">
+                <a16:creationId xmlns:a16="http://schemas.microsoft.com/office/drawing/2014/main" id="{42240DA1-7D3D-7914-60B1-F6185689AFCB}"/>
+              </a:ext>
+            </a:extLst>
+          </p:cNvPr>
+          <p:cNvSpPr txBox="1"/>
+          <p:nvPr/>
+        </p:nvSpPr>
+        <p:spPr>
+          <a:xfrm>
+            <a:off x="9349138" y="1049430"/>
+            <a:ext cx="3350843" cy="1034066"/>
+          </a:xfrm>
+          <a:prstGeom prst="rect">
+            <a:avLst/>
+          </a:prstGeom>
+          <a:noFill/>
+        </p:spPr>
+        <p:txBody>
+          <a:bodyPr wrap="square" rtlCol="0">
+            <a:spAutoFit/>
+          </a:bodyPr>
+          <a:lstStyle/>
+          <a:p>
+            <a:pPr algn="ctr">
+              <a:lnSpc>
+                <a:spcPts val="3500"/>
+              </a:lnSpc>
+            </a:pPr>
+            <a:r>
+              <a:rPr lang="en-US" sz="4400" dirty="0">
+                <a:latin typeface="Aptos SemiBold" panose="020B0004020202020204" pitchFamily="34" charset="0"/>
+              </a:rPr>
+              <a:t>Adaptation Topics</a:t>
+            </a:r>
+          </a:p>
+        </p:txBody>
+      </p:sp>
+      <p:sp>
+        <p:nvSpPr>
+          <p:cNvPr id="40" name="TextBox 39">
+            <a:extLst>
+              <a:ext uri="{FF2B5EF4-FFF2-40B4-BE49-F238E27FC236}">
+                <a16:creationId xmlns:a16="http://schemas.microsoft.com/office/drawing/2014/main" id="{3CE5A3A2-382A-2F32-95B3-713C78EDBAB2}"/>
+              </a:ext>
+            </a:extLst>
+          </p:cNvPr>
+          <p:cNvSpPr txBox="1"/>
+          <p:nvPr/>
+        </p:nvSpPr>
+        <p:spPr>
+          <a:xfrm>
+            <a:off x="10257692" y="1829204"/>
+            <a:ext cx="1356360" cy="2585131"/>
+          </a:xfrm>
+          <a:prstGeom prst="rect">
+            <a:avLst/>
+          </a:prstGeom>
+          <a:noFill/>
+        </p:spPr>
+        <p:txBody>
+          <a:bodyPr wrap="square" lIns="0" tIns="0" rIns="0" bIns="0">
+            <a:spAutoFit/>
+          </a:bodyPr>
+          <a:lstStyle/>
+          <a:p>
+            <a:pPr algn="ctr">
+              <a:lnSpc>
+                <a:spcPts val="10020"/>
+              </a:lnSpc>
+            </a:pPr>
+            <a:r>
+              <a:rPr lang="en-US" sz="9600" b="1" dirty="0">
+                <a:solidFill>
+                  <a:schemeClr val="bg2">
+                    <a:lumMod val="50000"/>
+                  </a:schemeClr>
+                </a:solidFill>
+              </a:rPr>
+              <a:t>…</a:t>
+            </a:r>
+          </a:p>
+          <a:p>
+            <a:pPr algn="ctr">
+              <a:lnSpc>
+                <a:spcPts val="10020"/>
+              </a:lnSpc>
+            </a:pPr>
+            <a:r>
+              <a:rPr lang="en-US" sz="9600" b="1" dirty="0">
+                <a:solidFill>
+                  <a:schemeClr val="bg2">
+                    <a:lumMod val="50000"/>
+                  </a:schemeClr>
+                </a:solidFill>
+              </a:rPr>
+              <a:t>…</a:t>
+            </a:r>
+          </a:p>
+        </p:txBody>
+      </p:sp>
+    </p:spTree>
+    <p:extLst>
+      <p:ext uri="{BB962C8B-B14F-4D97-AF65-F5344CB8AC3E}">
+        <p14:creationId xmlns:p14="http://schemas.microsoft.com/office/powerpoint/2010/main" val="2709825526"/>
+      </p:ext>
+    </p:extLst>
+  </p:cSld>
+  <p:clrMapOvr>
+    <a:masterClrMapping/>
+  </p:clrMapOvr>
+</p:sld>
+</file>
+
 <file path=ppt/theme/theme1.xml><?xml version="1.0" encoding="utf-8"?>
 <a:theme xmlns:a="http://schemas.openxmlformats.org/drawingml/2006/main" name="Office Theme">
   <a:themeElements>

</xml_diff>